<commit_message>
📝 Update documents (add blcok diagram)
</commit_message>
<xml_diff>
--- a/Documents/Temporary_Documents/Internship_Presentation.pptx
+++ b/Documents/Temporary_Documents/Internship_Presentation.pptx
@@ -2162,7 +2162,7 @@
           <a:p>
             <a:fld id="{DD244F5C-D091-45F6-BABE-BE35F3B61744}" type="datetimeFigureOut">
               <a:rPr lang="en-US" smtClean="0"/>
-              <a:t>9/18/2023</a:t>
+              <a:t>9/19/2023</a:t>
             </a:fld>
             <a:endParaRPr lang="en-US"/>
           </a:p>
@@ -2332,7 +2332,7 @@
           <a:p>
             <a:fld id="{2B28A9D0-D185-42F6-BAE3-7BA6CB795950}" type="datetimeFigureOut">
               <a:rPr lang="en-US" smtClean="0"/>
-              <a:t>9/18/2023</a:t>
+              <a:t>9/19/2023</a:t>
             </a:fld>
             <a:endParaRPr lang="en-US"/>
           </a:p>
@@ -2736,7 +2736,7 @@
           <a:p>
             <a:fld id="{157AF707-3790-4F26-8BCC-B0120AAC5AB2}" type="datetime1">
               <a:rPr lang="en-US" smtClean="0"/>
-              <a:t>9/18/2023</a:t>
+              <a:t>9/19/2023</a:t>
             </a:fld>
             <a:endParaRPr lang="en-US"/>
           </a:p>
@@ -2910,7 +2910,7 @@
           <a:p>
             <a:fld id="{3ADCAFA7-260D-424E-B0FC-F3A675BB99A3}" type="datetime1">
               <a:rPr lang="en-US" smtClean="0"/>
-              <a:t>9/18/2023</a:t>
+              <a:t>9/19/2023</a:t>
             </a:fld>
             <a:endParaRPr lang="en-US"/>
           </a:p>
@@ -3094,7 +3094,7 @@
           <a:p>
             <a:fld id="{17F18B29-60EE-4F87-9198-17809BAFFA6E}" type="datetime1">
               <a:rPr lang="en-US" smtClean="0"/>
-              <a:t>9/18/2023</a:t>
+              <a:t>9/19/2023</a:t>
             </a:fld>
             <a:endParaRPr lang="en-US"/>
           </a:p>
@@ -3268,7 +3268,7 @@
           <a:p>
             <a:fld id="{4452FC94-73BD-40D2-8592-4757593E2B9A}" type="datetime1">
               <a:rPr lang="en-US" smtClean="0"/>
-              <a:t>9/18/2023</a:t>
+              <a:t>9/19/2023</a:t>
             </a:fld>
             <a:endParaRPr lang="en-US"/>
           </a:p>
@@ -3518,7 +3518,7 @@
           <a:p>
             <a:fld id="{ED74287F-5380-4DF6-897C-AD7B83695236}" type="datetime1">
               <a:rPr lang="en-US" smtClean="0"/>
-              <a:t>9/18/2023</a:t>
+              <a:t>9/19/2023</a:t>
             </a:fld>
             <a:endParaRPr lang="en-US"/>
           </a:p>
@@ -3754,7 +3754,7 @@
           <a:p>
             <a:fld id="{D5730613-39DB-4E9A-9565-5BCF8C964558}" type="datetime1">
               <a:rPr lang="en-US" smtClean="0"/>
-              <a:t>9/18/2023</a:t>
+              <a:t>9/19/2023</a:t>
             </a:fld>
             <a:endParaRPr lang="en-US"/>
           </a:p>
@@ -4125,7 +4125,7 @@
           <a:p>
             <a:fld id="{1426A32B-D0D6-42E2-8216-3D06182BB4B8}" type="datetime1">
               <a:rPr lang="en-US" smtClean="0"/>
-              <a:t>9/18/2023</a:t>
+              <a:t>9/19/2023</a:t>
             </a:fld>
             <a:endParaRPr lang="en-US"/>
           </a:p>
@@ -4247,7 +4247,7 @@
           <a:p>
             <a:fld id="{2CB896B3-97F4-435F-9488-04DD1E61742D}" type="datetime1">
               <a:rPr lang="en-US" smtClean="0"/>
-              <a:t>9/18/2023</a:t>
+              <a:t>9/19/2023</a:t>
             </a:fld>
             <a:endParaRPr lang="en-US"/>
           </a:p>
@@ -4346,7 +4346,7 @@
           <a:p>
             <a:fld id="{1B856AA1-02EC-4FC9-87A6-0935ACE31862}" type="datetime1">
               <a:rPr lang="en-US" smtClean="0"/>
-              <a:t>9/18/2023</a:t>
+              <a:t>9/19/2023</a:t>
             </a:fld>
             <a:endParaRPr lang="en-US"/>
           </a:p>
@@ -4627,7 +4627,7 @@
           <a:p>
             <a:fld id="{6DB260CF-236D-4E54-9FDB-4836FA36E3AB}" type="datetime1">
               <a:rPr lang="en-US" smtClean="0"/>
-              <a:t>9/18/2023</a:t>
+              <a:t>9/19/2023</a:t>
             </a:fld>
             <a:endParaRPr lang="en-US"/>
           </a:p>
@@ -4884,7 +4884,7 @@
           <a:p>
             <a:fld id="{D836B804-681C-49DD-8723-42681E33C66C}" type="datetime1">
               <a:rPr lang="en-US" smtClean="0"/>
-              <a:t>9/18/2023</a:t>
+              <a:t>9/19/2023</a:t>
             </a:fld>
             <a:endParaRPr lang="en-US"/>
           </a:p>
@@ -5101,7 +5101,7 @@
           <a:p>
             <a:fld id="{C6A0AECA-76B3-4D5E-9925-13FE031A99FA}" type="datetime1">
               <a:rPr lang="en-US" smtClean="0"/>
-              <a:t>9/18/2023</a:t>
+              <a:t>9/19/2023</a:t>
             </a:fld>
             <a:endParaRPr lang="en-US"/>
           </a:p>
@@ -20513,37 +20513,36 @@
           </a:p>
         </p:txBody>
       </p:sp>
-      <p:sp>
-        <p:nvSpPr>
-          <p:cNvPr id="4" name="TextBox 3"/>
-          <p:cNvSpPr txBox="1"/>
+      <p:pic>
+        <p:nvPicPr>
+          <p:cNvPr id="9" name="Picture 8"/>
+          <p:cNvPicPr>
+            <a:picLocks noChangeAspect="1"/>
+          </p:cNvPicPr>
           <p:nvPr/>
-        </p:nvSpPr>
+        </p:nvPicPr>
+        <p:blipFill>
+          <a:blip r:embed="rId3" cstate="print">
+            <a:extLst>
+              <a:ext uri="{28A0092B-C50C-407E-A947-70E740481C1C}">
+                <a14:useLocalDpi xmlns:a14="http://schemas.microsoft.com/office/drawing/2010/main" val="0"/>
+              </a:ext>
+            </a:extLst>
+          </a:blip>
+          <a:stretch>
+            <a:fillRect/>
+          </a:stretch>
+        </p:blipFill>
         <p:spPr>
           <a:xfrm>
-            <a:off x="3565236" y="2613892"/>
-            <a:ext cx="5338619" cy="3046988"/>
+            <a:off x="1302327" y="1964214"/>
+            <a:ext cx="9060873" cy="4768881"/>
           </a:xfrm>
           <a:prstGeom prst="rect">
             <a:avLst/>
           </a:prstGeom>
-          <a:noFill/>
         </p:spPr>
-        <p:txBody>
-          <a:bodyPr wrap="square" rtlCol="0">
-            <a:spAutoFit/>
-          </a:bodyPr>
-          <a:lstStyle/>
-          <a:p>
-            <a:pPr algn="ctr"/>
-            <a:r>
-              <a:rPr lang="en-US" sz="9600" dirty="0" smtClean="0"/>
-              <a:t>BLOCK DIAGRAM</a:t>
-            </a:r>
-            <a:endParaRPr lang="en-US" sz="9600" dirty="0"/>
-          </a:p>
-        </p:txBody>
-      </p:sp>
+      </p:pic>
     </p:spTree>
     <p:extLst>
       <p:ext uri="{BB962C8B-B14F-4D97-AF65-F5344CB8AC3E}">

</xml_diff>